<commit_message>
latest changes from swapnil
</commit_message>
<xml_diff>
--- a/Model Architecture.pptx
+++ b/Model Architecture.pptx
@@ -105,6 +105,11 @@
       </a:defRPr>
     </a:lvl9pPr>
   </p:defaultTextStyle>
+  <p:extLst>
+    <p:ext uri="{EFAFB233-063F-42B5-8137-9DF3F51BA10A}">
+      <p15:sldGuideLst xmlns:p15="http://schemas.microsoft.com/office/powerpoint/2012/main"/>
+    </p:ext>
+  </p:extLst>
 </p:presentation>
 </file>
 
@@ -255,7 +260,7 @@
           <a:p>
             <a:fld id="{BD611932-6955-1A44-B342-F649052AA843}" type="datetimeFigureOut">
               <a:rPr lang="en-US" smtClean="0"/>
-              <a:t>9/28/24</a:t>
+              <a:t>12/18/24</a:t>
             </a:fld>
             <a:endParaRPr lang="en-US"/>
           </a:p>
@@ -453,7 +458,7 @@
           <a:p>
             <a:fld id="{BD611932-6955-1A44-B342-F649052AA843}" type="datetimeFigureOut">
               <a:rPr lang="en-US" smtClean="0"/>
-              <a:t>9/28/24</a:t>
+              <a:t>12/18/24</a:t>
             </a:fld>
             <a:endParaRPr lang="en-US"/>
           </a:p>
@@ -661,7 +666,7 @@
           <a:p>
             <a:fld id="{BD611932-6955-1A44-B342-F649052AA843}" type="datetimeFigureOut">
               <a:rPr lang="en-US" smtClean="0"/>
-              <a:t>9/28/24</a:t>
+              <a:t>12/18/24</a:t>
             </a:fld>
             <a:endParaRPr lang="en-US"/>
           </a:p>
@@ -859,7 +864,7 @@
           <a:p>
             <a:fld id="{BD611932-6955-1A44-B342-F649052AA843}" type="datetimeFigureOut">
               <a:rPr lang="en-US" smtClean="0"/>
-              <a:t>9/28/24</a:t>
+              <a:t>12/18/24</a:t>
             </a:fld>
             <a:endParaRPr lang="en-US"/>
           </a:p>
@@ -1134,7 +1139,7 @@
           <a:p>
             <a:fld id="{BD611932-6955-1A44-B342-F649052AA843}" type="datetimeFigureOut">
               <a:rPr lang="en-US" smtClean="0"/>
-              <a:t>9/28/24</a:t>
+              <a:t>12/18/24</a:t>
             </a:fld>
             <a:endParaRPr lang="en-US"/>
           </a:p>
@@ -1399,7 +1404,7 @@
           <a:p>
             <a:fld id="{BD611932-6955-1A44-B342-F649052AA843}" type="datetimeFigureOut">
               <a:rPr lang="en-US" smtClean="0"/>
-              <a:t>9/28/24</a:t>
+              <a:t>12/18/24</a:t>
             </a:fld>
             <a:endParaRPr lang="en-US"/>
           </a:p>
@@ -1811,7 +1816,7 @@
           <a:p>
             <a:fld id="{BD611932-6955-1A44-B342-F649052AA843}" type="datetimeFigureOut">
               <a:rPr lang="en-US" smtClean="0"/>
-              <a:t>9/28/24</a:t>
+              <a:t>12/18/24</a:t>
             </a:fld>
             <a:endParaRPr lang="en-US"/>
           </a:p>
@@ -1952,7 +1957,7 @@
           <a:p>
             <a:fld id="{BD611932-6955-1A44-B342-F649052AA843}" type="datetimeFigureOut">
               <a:rPr lang="en-US" smtClean="0"/>
-              <a:t>9/28/24</a:t>
+              <a:t>12/18/24</a:t>
             </a:fld>
             <a:endParaRPr lang="en-US"/>
           </a:p>
@@ -2065,7 +2070,7 @@
           <a:p>
             <a:fld id="{BD611932-6955-1A44-B342-F649052AA843}" type="datetimeFigureOut">
               <a:rPr lang="en-US" smtClean="0"/>
-              <a:t>9/28/24</a:t>
+              <a:t>12/18/24</a:t>
             </a:fld>
             <a:endParaRPr lang="en-US"/>
           </a:p>
@@ -2376,7 +2381,7 @@
           <a:p>
             <a:fld id="{BD611932-6955-1A44-B342-F649052AA843}" type="datetimeFigureOut">
               <a:rPr lang="en-US" smtClean="0"/>
-              <a:t>9/28/24</a:t>
+              <a:t>12/18/24</a:t>
             </a:fld>
             <a:endParaRPr lang="en-US"/>
           </a:p>
@@ -2664,7 +2669,7 @@
           <a:p>
             <a:fld id="{BD611932-6955-1A44-B342-F649052AA843}" type="datetimeFigureOut">
               <a:rPr lang="en-US" smtClean="0"/>
-              <a:t>9/28/24</a:t>
+              <a:t>12/18/24</a:t>
             </a:fld>
             <a:endParaRPr lang="en-US"/>
           </a:p>
@@ -2905,7 +2910,7 @@
           <a:p>
             <a:fld id="{BD611932-6955-1A44-B342-F649052AA843}" type="datetimeFigureOut">
               <a:rPr lang="en-US" smtClean="0"/>
-              <a:t>9/28/24</a:t>
+              <a:t>12/18/24</a:t>
             </a:fld>
             <a:endParaRPr lang="en-US"/>
           </a:p>
@@ -3501,20 +3506,6 @@
               <a:t>Eviction Lab</a:t>
             </a:r>
           </a:p>
-          <a:p>
-            <a:pPr marL="285750" indent="-285750">
-              <a:buFont typeface="Arial" panose="020B0604020202020204" pitchFamily="34" charset="0"/>
-              <a:buChar char="•"/>
-            </a:pPr>
-            <a:r>
-              <a:rPr lang="en-US" sz="1400" dirty="0">
-                <a:solidFill>
-                  <a:sysClr val="windowText" lastClr="000000"/>
-                </a:solidFill>
-              </a:rPr>
-              <a:t>Airbnb</a:t>
-            </a:r>
-          </a:p>
         </p:txBody>
       </p:sp>
       <p:sp>
@@ -3599,7 +3590,7 @@
                   <a:sysClr val="windowText" lastClr="000000"/>
                 </a:solidFill>
               </a:rPr>
-              <a:t>Temporal Feature Engineering</a:t>
+              <a:t>Feature Engineering</a:t>
             </a:r>
           </a:p>
           <a:p>
@@ -3613,21 +3604,7 @@
                   <a:sysClr val="windowText" lastClr="000000"/>
                 </a:solidFill>
               </a:rPr>
-              <a:t>Spatial Feature Extraction</a:t>
-            </a:r>
-          </a:p>
-          <a:p>
-            <a:pPr marL="285750" indent="-285750">
-              <a:buFont typeface="Arial" panose="020B0604020202020204" pitchFamily="34" charset="0"/>
-              <a:buChar char="•"/>
-            </a:pPr>
-            <a:r>
-              <a:rPr lang="en-US" sz="1400" dirty="0">
-                <a:solidFill>
-                  <a:sysClr val="windowText" lastClr="000000"/>
-                </a:solidFill>
-              </a:rPr>
-              <a:t>Airbnb Frequency Integration</a:t>
+              <a:t>Spatial Feature Processing</a:t>
             </a:r>
           </a:p>
         </p:txBody>
@@ -3646,8 +3623,8 @@
         </p:nvSpPr>
         <p:spPr>
           <a:xfrm>
-            <a:off x="2708312" y="2296338"/>
-            <a:ext cx="6775375" cy="2265324"/>
+            <a:off x="2343838" y="2317693"/>
+            <a:ext cx="7504324" cy="2265324"/>
           </a:xfrm>
           <a:prstGeom prst="rect">
             <a:avLst/>
@@ -3705,7 +3682,7 @@
         </p:nvSpPr>
         <p:spPr>
           <a:xfrm>
-            <a:off x="3120007" y="2675023"/>
+            <a:off x="2573554" y="2696378"/>
             <a:ext cx="1703545" cy="1638760"/>
           </a:xfrm>
           <a:prstGeom prst="rect">
@@ -3787,7 +3764,7 @@
                   <a:sysClr val="windowText" lastClr="000000"/>
                 </a:solidFill>
               </a:rPr>
-              <a:t>Decision Tree</a:t>
+              <a:t>LGBM</a:t>
             </a:r>
           </a:p>
           <a:p>
@@ -3796,18 +3773,13 @@
               <a:buChar char="•"/>
             </a:pPr>
             <a:r>
-              <a:rPr lang="en-US" sz="1400" dirty="0" err="1">
+              <a:rPr lang="en-US" sz="1400" dirty="0">
                 <a:solidFill>
                   <a:sysClr val="windowText" lastClr="000000"/>
                 </a:solidFill>
               </a:rPr>
-              <a:t>XGBoost</a:t>
-            </a:r>
-            <a:endParaRPr lang="en-US" sz="1400" dirty="0">
-              <a:solidFill>
-                <a:sysClr val="windowText" lastClr="000000"/>
-              </a:solidFill>
-            </a:endParaRPr>
+              <a:t>Naïve Bayes</a:t>
+            </a:r>
           </a:p>
         </p:txBody>
       </p:sp>
@@ -3825,7 +3797,7 @@
         </p:nvSpPr>
         <p:spPr>
           <a:xfrm>
-            <a:off x="5224230" y="2675023"/>
+            <a:off x="4339927" y="2696378"/>
             <a:ext cx="1703545" cy="1638760"/>
           </a:xfrm>
           <a:prstGeom prst="rect">
@@ -3865,7 +3837,7 @@
                   <a:sysClr val="windowText" lastClr="000000"/>
                 </a:solidFill>
               </a:rPr>
-              <a:t>Temporal Prediction</a:t>
+              <a:t>Early Prediction</a:t>
             </a:r>
           </a:p>
           <a:p>
@@ -3879,21 +3851,7 @@
                   <a:sysClr val="windowText" lastClr="000000"/>
                 </a:solidFill>
               </a:rPr>
-              <a:t>LSTMs</a:t>
-            </a:r>
-          </a:p>
-          <a:p>
-            <a:pPr marL="285750" indent="-285750">
-              <a:buFont typeface="Arial" panose="020B0604020202020204" pitchFamily="34" charset="0"/>
-              <a:buChar char="•"/>
-            </a:pPr>
-            <a:r>
-              <a:rPr lang="en-US" sz="1400" dirty="0">
-                <a:solidFill>
-                  <a:sysClr val="windowText" lastClr="000000"/>
-                </a:solidFill>
-              </a:rPr>
-              <a:t>ARIMA</a:t>
+              <a:t>SARIMAX</a:t>
             </a:r>
           </a:p>
         </p:txBody>
@@ -3912,7 +3870,7 @@
         </p:nvSpPr>
         <p:spPr>
           <a:xfrm>
-            <a:off x="7328453" y="2675023"/>
+            <a:off x="6106300" y="2699850"/>
             <a:ext cx="1703545" cy="1638760"/>
           </a:xfrm>
           <a:prstGeom prst="rect">
@@ -3952,7 +3910,7 @@
                   <a:sysClr val="windowText" lastClr="000000"/>
                 </a:solidFill>
               </a:rPr>
-              <a:t>Geospatial Modeling</a:t>
+              <a:t>Spill-over effect analysis</a:t>
             </a:r>
           </a:p>
           <a:p>
@@ -3966,21 +3924,7 @@
                   <a:sysClr val="windowText" lastClr="000000"/>
                 </a:solidFill>
               </a:rPr>
-              <a:t>Spatial Tag</a:t>
-            </a:r>
-          </a:p>
-          <a:p>
-            <a:pPr marL="285750" indent="-285750">
-              <a:buFont typeface="Arial" panose="020B0604020202020204" pitchFamily="34" charset="0"/>
-              <a:buChar char="•"/>
-            </a:pPr>
-            <a:r>
-              <a:rPr lang="en-US" sz="1400" dirty="0">
-                <a:solidFill>
-                  <a:sysClr val="windowText" lastClr="000000"/>
-                </a:solidFill>
-              </a:rPr>
-              <a:t>Geographic Weighted Model</a:t>
+              <a:t>Geographically Weighted Regressor</a:t>
             </a:r>
           </a:p>
         </p:txBody>
@@ -4000,7 +3944,7 @@
         <p:spPr>
           <a:xfrm>
             <a:off x="3511505" y="5056063"/>
-            <a:ext cx="1712725" cy="1020418"/>
+            <a:ext cx="1712725" cy="848978"/>
           </a:xfrm>
           <a:prstGeom prst="rect">
             <a:avLst/>
@@ -4073,7 +4017,7 @@
         <p:spPr>
           <a:xfrm>
             <a:off x="6713961" y="5056063"/>
-            <a:ext cx="1852076" cy="1020418"/>
+            <a:ext cx="1852076" cy="848978"/>
           </a:xfrm>
           <a:prstGeom prst="rect">
             <a:avLst/>
@@ -4127,20 +4071,6 @@
                 </a:solidFill>
               </a:rPr>
               <a:t>Spatial Visualization</a:t>
-            </a:r>
-          </a:p>
-          <a:p>
-            <a:pPr marL="285750" indent="-285750">
-              <a:buFont typeface="Arial" panose="020B0604020202020204" pitchFamily="34" charset="0"/>
-              <a:buChar char="•"/>
-            </a:pPr>
-            <a:r>
-              <a:rPr lang="en-US" sz="1400" dirty="0">
-                <a:solidFill>
-                  <a:sysClr val="windowText" lastClr="000000"/>
-                </a:solidFill>
-              </a:rPr>
-              <a:t>Temporal Trends</a:t>
             </a:r>
           </a:p>
         </p:txBody>
@@ -4197,6 +4127,7 @@
             </a:extLst>
           </p:cNvPr>
           <p:cNvCxnSpPr>
+            <a:cxnSpLocks/>
             <a:stCxn id="8" idx="2"/>
             <a:endCxn id="9" idx="0"/>
           </p:cNvCxnSpPr>
@@ -4205,7 +4136,7 @@
         <p:spPr>
           <a:xfrm>
             <a:off x="6096000" y="1923122"/>
-            <a:ext cx="0" cy="373216"/>
+            <a:ext cx="0" cy="394571"/>
           </a:xfrm>
           <a:prstGeom prst="straightConnector1">
             <a:avLst/>
@@ -4239,6 +4170,7 @@
             </a:extLst>
           </p:cNvPr>
           <p:cNvCxnSpPr>
+            <a:cxnSpLocks/>
             <a:stCxn id="9" idx="2"/>
             <a:endCxn id="14" idx="0"/>
           </p:cNvCxnSpPr>
@@ -4246,8 +4178,8 @@
         </p:nvCxnSpPr>
         <p:spPr>
           <a:xfrm rot="5400000">
-            <a:off x="4984734" y="3944796"/>
-            <a:ext cx="494401" cy="1728132"/>
+            <a:off x="4995411" y="3955474"/>
+            <a:ext cx="473046" cy="1728132"/>
           </a:xfrm>
           <a:prstGeom prst="bentConnector3">
             <a:avLst/>
@@ -4281,6 +4213,7 @@
             </a:extLst>
           </p:cNvPr>
           <p:cNvCxnSpPr>
+            <a:cxnSpLocks/>
             <a:stCxn id="9" idx="2"/>
             <a:endCxn id="15" idx="0"/>
           </p:cNvCxnSpPr>
@@ -4288,8 +4221,8 @@
         </p:nvCxnSpPr>
         <p:spPr>
           <a:xfrm rot="16200000" flipH="1">
-            <a:off x="6620799" y="4036862"/>
-            <a:ext cx="494401" cy="1543999"/>
+            <a:off x="6631476" y="4047540"/>
+            <a:ext cx="473046" cy="1543999"/>
           </a:xfrm>
           <a:prstGeom prst="bentConnector3">
             <a:avLst/>
@@ -4313,6 +4246,79 @@
           </a:fontRef>
         </p:style>
       </p:cxnSp>
+      <p:sp>
+        <p:nvSpPr>
+          <p:cNvPr id="2" name="Rectangle 1">
+            <a:extLst>
+              <a:ext uri="{FF2B5EF4-FFF2-40B4-BE49-F238E27FC236}">
+                <a16:creationId xmlns:a16="http://schemas.microsoft.com/office/drawing/2014/main" id="{34F42B95-5663-12A3-EFE0-B2B86FC09827}"/>
+              </a:ext>
+            </a:extLst>
+          </p:cNvPr>
+          <p:cNvSpPr/>
+          <p:nvPr/>
+        </p:nvSpPr>
+        <p:spPr>
+          <a:xfrm>
+            <a:off x="7872673" y="2696378"/>
+            <a:ext cx="1703545" cy="1638760"/>
+          </a:xfrm>
+          <a:prstGeom prst="rect">
+            <a:avLst/>
+          </a:prstGeom>
+          <a:solidFill>
+            <a:schemeClr val="accent5">
+              <a:lumMod val="40000"/>
+              <a:lumOff val="60000"/>
+            </a:schemeClr>
+          </a:solidFill>
+        </p:spPr>
+        <p:style>
+          <a:lnRef idx="2">
+            <a:schemeClr val="accent1">
+              <a:shade val="15000"/>
+            </a:schemeClr>
+          </a:lnRef>
+          <a:fillRef idx="1">
+            <a:schemeClr val="accent1"/>
+          </a:fillRef>
+          <a:effectRef idx="0">
+            <a:schemeClr val="accent1"/>
+          </a:effectRef>
+          <a:fontRef idx="minor">
+            <a:schemeClr val="lt1"/>
+          </a:fontRef>
+        </p:style>
+        <p:txBody>
+          <a:bodyPr rtlCol="0" anchor="t"/>
+          <a:lstStyle/>
+          <a:p>
+            <a:pPr algn="ctr"/>
+            <a:r>
+              <a:rPr lang="en-US" sz="1600" b="1" dirty="0">
+                <a:solidFill>
+                  <a:sysClr val="windowText" lastClr="000000"/>
+                </a:solidFill>
+              </a:rPr>
+              <a:t>Cluster Analysis</a:t>
+            </a:r>
+          </a:p>
+          <a:p>
+            <a:pPr marL="285750" indent="-285750">
+              <a:buFont typeface="Arial" panose="020B0604020202020204" pitchFamily="34" charset="0"/>
+              <a:buChar char="•"/>
+            </a:pPr>
+            <a:r>
+              <a:rPr lang="en-US" sz="1400" dirty="0">
+                <a:solidFill>
+                  <a:sysClr val="windowText" lastClr="000000"/>
+                </a:solidFill>
+              </a:rPr>
+              <a:t>K Means</a:t>
+            </a:r>
+          </a:p>
+        </p:txBody>
+      </p:sp>
     </p:spTree>
     <p:extLst>
       <p:ext uri="{BB962C8B-B14F-4D97-AF65-F5344CB8AC3E}">

</xml_diff>